<commit_message>
remove bercot's Ante-nicean-parser; it's on google drive now
</commit_message>
<xml_diff>
--- a/files/stimulus_and_response.pptx
+++ b/files/stimulus_and_response.pptx
@@ -245,7 +245,7 @@
           <a:p>
             <a:fld id="{D7AD4F40-27AF-4249-80F2-CCF82E4073B0}" type="datetimeFigureOut">
               <a:rPr lang="en-US" smtClean="0"/>
-              <a:t>3/31/2020</a:t>
+              <a:t>4/1/2020</a:t>
             </a:fld>
             <a:endParaRPr lang="en-US"/>
           </a:p>
@@ -415,7 +415,7 @@
           <a:p>
             <a:fld id="{D7AD4F40-27AF-4249-80F2-CCF82E4073B0}" type="datetimeFigureOut">
               <a:rPr lang="en-US" smtClean="0"/>
-              <a:t>3/31/2020</a:t>
+              <a:t>4/1/2020</a:t>
             </a:fld>
             <a:endParaRPr lang="en-US"/>
           </a:p>
@@ -595,7 +595,7 @@
           <a:p>
             <a:fld id="{D7AD4F40-27AF-4249-80F2-CCF82E4073B0}" type="datetimeFigureOut">
               <a:rPr lang="en-US" smtClean="0"/>
-              <a:t>3/31/2020</a:t>
+              <a:t>4/1/2020</a:t>
             </a:fld>
             <a:endParaRPr lang="en-US"/>
           </a:p>
@@ -765,7 +765,7 @@
           <a:p>
             <a:fld id="{D7AD4F40-27AF-4249-80F2-CCF82E4073B0}" type="datetimeFigureOut">
               <a:rPr lang="en-US" smtClean="0"/>
-              <a:t>3/31/2020</a:t>
+              <a:t>4/1/2020</a:t>
             </a:fld>
             <a:endParaRPr lang="en-US"/>
           </a:p>
@@ -1009,7 +1009,7 @@
           <a:p>
             <a:fld id="{D7AD4F40-27AF-4249-80F2-CCF82E4073B0}" type="datetimeFigureOut">
               <a:rPr lang="en-US" smtClean="0"/>
-              <a:t>3/31/2020</a:t>
+              <a:t>4/1/2020</a:t>
             </a:fld>
             <a:endParaRPr lang="en-US"/>
           </a:p>
@@ -1241,7 +1241,7 @@
           <a:p>
             <a:fld id="{D7AD4F40-27AF-4249-80F2-CCF82E4073B0}" type="datetimeFigureOut">
               <a:rPr lang="en-US" smtClean="0"/>
-              <a:t>3/31/2020</a:t>
+              <a:t>4/1/2020</a:t>
             </a:fld>
             <a:endParaRPr lang="en-US"/>
           </a:p>
@@ -1608,7 +1608,7 @@
           <a:p>
             <a:fld id="{D7AD4F40-27AF-4249-80F2-CCF82E4073B0}" type="datetimeFigureOut">
               <a:rPr lang="en-US" smtClean="0"/>
-              <a:t>3/31/2020</a:t>
+              <a:t>4/1/2020</a:t>
             </a:fld>
             <a:endParaRPr lang="en-US"/>
           </a:p>
@@ -1726,7 +1726,7 @@
           <a:p>
             <a:fld id="{D7AD4F40-27AF-4249-80F2-CCF82E4073B0}" type="datetimeFigureOut">
               <a:rPr lang="en-US" smtClean="0"/>
-              <a:t>3/31/2020</a:t>
+              <a:t>4/1/2020</a:t>
             </a:fld>
             <a:endParaRPr lang="en-US"/>
           </a:p>
@@ -1821,7 +1821,7 @@
           <a:p>
             <a:fld id="{D7AD4F40-27AF-4249-80F2-CCF82E4073B0}" type="datetimeFigureOut">
               <a:rPr lang="en-US" smtClean="0"/>
-              <a:t>3/31/2020</a:t>
+              <a:t>4/1/2020</a:t>
             </a:fld>
             <a:endParaRPr lang="en-US"/>
           </a:p>
@@ -2098,7 +2098,7 @@
           <a:p>
             <a:fld id="{D7AD4F40-27AF-4249-80F2-CCF82E4073B0}" type="datetimeFigureOut">
               <a:rPr lang="en-US" smtClean="0"/>
-              <a:t>3/31/2020</a:t>
+              <a:t>4/1/2020</a:t>
             </a:fld>
             <a:endParaRPr lang="en-US"/>
           </a:p>
@@ -2355,7 +2355,7 @@
           <a:p>
             <a:fld id="{D7AD4F40-27AF-4249-80F2-CCF82E4073B0}" type="datetimeFigureOut">
               <a:rPr lang="en-US" smtClean="0"/>
-              <a:t>3/31/2020</a:t>
+              <a:t>4/1/2020</a:t>
             </a:fld>
             <a:endParaRPr lang="en-US"/>
           </a:p>
@@ -2568,7 +2568,7 @@
           <a:p>
             <a:fld id="{D7AD4F40-27AF-4249-80F2-CCF82E4073B0}" type="datetimeFigureOut">
               <a:rPr lang="en-US" smtClean="0"/>
-              <a:t>3/31/2020</a:t>
+              <a:t>4/1/2020</a:t>
             </a:fld>
             <a:endParaRPr lang="en-US"/>
           </a:p>
@@ -3582,7 +3582,7 @@
           </p:nvSpPr>
           <p:spPr>
             <a:xfrm>
-              <a:off x="3894018" y="3832996"/>
+              <a:off x="3906160" y="3789052"/>
               <a:ext cx="1557868" cy="369332"/>
             </a:xfrm>
             <a:prstGeom prst="rect">
@@ -3820,8 +3820,8 @@
           </p:nvSpPr>
           <p:spPr>
             <a:xfrm>
-              <a:off x="3894017" y="5736390"/>
-              <a:ext cx="1699273" cy="369332"/>
+              <a:off x="3900117" y="5123397"/>
+              <a:ext cx="2819090" cy="1200329"/>
             </a:xfrm>
             <a:prstGeom prst="rect">
               <a:avLst/>
@@ -3836,9 +3836,18 @@
             <a:p>
               <a:r>
                 <a:rPr lang="en-US" b="1" dirty="0" smtClean="0"/>
+                <a:t>My identity as a member of Jesus’ kingdom and family</a:t>
+              </a:r>
+              <a:endParaRPr lang="en-US" b="1" dirty="0" smtClean="0"/>
+            </a:p>
+            <a:p>
+              <a:endParaRPr lang="en-US" b="1" dirty="0"/>
+            </a:p>
+            <a:p>
+              <a:r>
+                <a:rPr lang="en-US" b="1" dirty="0" smtClean="0"/>
                 <a:t>God’s promises</a:t>
               </a:r>
-              <a:endParaRPr lang="en-US" b="1" dirty="0"/>
             </a:p>
           </p:txBody>
         </p:sp>

</xml_diff>